<commit_message>
reworked the discussion on namespace
</commit_message>
<xml_diff>
--- a/w4/w4-s4-av-slide1.pptx
+++ b/w4/w4-s4-av-slide1.pptx
@@ -5,16 +5,15 @@
     <p:sldMasterId id="2147483649" r:id="rId1"/>
   </p:sldMasterIdLst>
   <p:notesMasterIdLst>
-    <p:notesMasterId r:id="rId6"/>
+    <p:notesMasterId r:id="rId5"/>
   </p:notesMasterIdLst>
   <p:handoutMasterIdLst>
-    <p:handoutMasterId r:id="rId7"/>
+    <p:handoutMasterId r:id="rId6"/>
   </p:handoutMasterIdLst>
   <p:sldIdLst>
     <p:sldId id="258" r:id="rId2"/>
-    <p:sldId id="256" r:id="rId3"/>
-    <p:sldId id="259" r:id="rId4"/>
-    <p:sldId id="260" r:id="rId5"/>
+    <p:sldId id="259" r:id="rId3"/>
+    <p:sldId id="260" r:id="rId4"/>
   </p:sldIdLst>
   <p:sldSz cx="12192000" cy="6858000"/>
   <p:notesSz cx="7099300" cy="10234613"/>
@@ -149,7 +148,6 @@
         <p14:section name="Section par défaut" id="{28C650F0-13B2-49C9-9ED4-D40CD07835D6}">
           <p14:sldIdLst>
             <p14:sldId id="258"/>
-            <p14:sldId id="256"/>
             <p14:sldId id="259"/>
             <p14:sldId id="260"/>
           </p14:sldIdLst>
@@ -583,7 +581,7 @@
           </a:ln>
           <a:extLst>
             <a:ext uri="{909E8E84-426E-40dd-AFC4-6F175D3DCCD1}">
-              <a14:hiddenFill xmlns:a14="http://schemas.microsoft.com/office/drawing/2010/main" xmlns="">
+              <a14:hiddenFill xmlns="" xmlns:a14="http://schemas.microsoft.com/office/drawing/2010/main">
                 <a:solidFill>
                   <a:srgbClr val="FFFFFF"/>
                 </a:solidFill>
@@ -3598,14 +3596,14 @@
           </a:ln>
           <a:extLst>
             <a:ext uri="{909E8E84-426E-40dd-AFC4-6F175D3DCCD1}">
-              <a14:hiddenFill xmlns:a14="http://schemas.microsoft.com/office/drawing/2010/main" xmlns="">
+              <a14:hiddenFill xmlns="" xmlns:a14="http://schemas.microsoft.com/office/drawing/2010/main">
                 <a:solidFill>
                   <a:srgbClr val="FFFFFF"/>
                 </a:solidFill>
               </a14:hiddenFill>
             </a:ext>
             <a:ext uri="{91240B29-F687-4f45-9708-019B960494DF}">
-              <a14:hiddenLine xmlns:a14="http://schemas.microsoft.com/office/drawing/2010/main" xmlns="" w="9525">
+              <a14:hiddenLine xmlns="" xmlns:a14="http://schemas.microsoft.com/office/drawing/2010/main" w="9525">
                 <a:solidFill>
                   <a:srgbClr val="000000"/>
                 </a:solidFill>
@@ -3656,14 +3654,14 @@
           </a:ln>
           <a:extLst>
             <a:ext uri="{909E8E84-426E-40dd-AFC4-6F175D3DCCD1}">
-              <a14:hiddenFill xmlns:a14="http://schemas.microsoft.com/office/drawing/2010/main" xmlns="">
+              <a14:hiddenFill xmlns="" xmlns:a14="http://schemas.microsoft.com/office/drawing/2010/main">
                 <a:solidFill>
                   <a:srgbClr val="FFFFFF"/>
                 </a:solidFill>
               </a14:hiddenFill>
             </a:ext>
             <a:ext uri="{91240B29-F687-4f45-9708-019B960494DF}">
-              <a14:hiddenLine xmlns:a14="http://schemas.microsoft.com/office/drawing/2010/main" xmlns="" w="9525">
+              <a14:hiddenLine xmlns="" xmlns:a14="http://schemas.microsoft.com/office/drawing/2010/main" w="9525">
                 <a:solidFill>
                   <a:srgbClr val="000000"/>
                 </a:solidFill>
@@ -5031,1005 +5029,6 @@
       </p:grpSpPr>
       <p:sp>
         <p:nvSpPr>
-          <p:cNvPr id="4" name="Rectangle 3"/>
-          <p:cNvSpPr/>
-          <p:nvPr/>
-        </p:nvSpPr>
-        <p:spPr bwMode="auto">
-          <a:xfrm>
-            <a:off x="622357" y="704189"/>
-            <a:ext cx="2714811" cy="1382519"/>
-          </a:xfrm>
-          <a:prstGeom prst="rect">
-            <a:avLst/>
-          </a:prstGeom>
-          <a:solidFill>
-            <a:schemeClr val="bg2">
-              <a:lumMod val="40000"/>
-              <a:lumOff val="60000"/>
-            </a:schemeClr>
-          </a:solidFill>
-          <a:ln w="38100" cap="flat" cmpd="sng" algn="ctr">
-            <a:solidFill>
-              <a:schemeClr val="bg2">
-                <a:lumMod val="40000"/>
-                <a:lumOff val="60000"/>
-              </a:schemeClr>
-            </a:solidFill>
-            <a:prstDash val="solid"/>
-            <a:round/>
-            <a:headEnd type="none" w="med" len="med"/>
-            <a:tailEnd type="none" w="med" len="med"/>
-          </a:ln>
-          <a:effectLst/>
-        </p:spPr>
-        <p:txBody>
-          <a:bodyPr vert="horz" wrap="square" lIns="90000" tIns="46800" rIns="90000" bIns="46800" numCol="1" rtlCol="0" anchor="ctr" anchorCtr="0" compatLnSpc="1">
-            <a:prstTxWarp prst="textNoShape">
-              <a:avLst/>
-            </a:prstTxWarp>
-            <a:spAutoFit/>
-          </a:bodyPr>
-          <a:lstStyle/>
-          <a:p>
-            <a:pPr marL="0" marR="0" indent="0" algn="ctr" defTabSz="914400" rtl="0" eaLnBrk="1" fontAlgn="base" latinLnBrk="0" hangingPunct="1">
-              <a:lnSpc>
-                <a:spcPct val="100000"/>
-              </a:lnSpc>
-              <a:spcBef>
-                <a:spcPct val="50000"/>
-              </a:spcBef>
-              <a:spcAft>
-                <a:spcPct val="0"/>
-              </a:spcAft>
-              <a:buClrTx/>
-              <a:buSzTx/>
-              <a:buFontTx/>
-              <a:buNone/>
-              <a:tabLst/>
-            </a:pPr>
-            <a:endParaRPr kumimoji="0" lang="fr-FR" sz="2400" b="0" i="0" u="none" strike="noStrike" cap="none" normalizeH="0" baseline="0" smtClean="0">
-              <a:ln>
-                <a:noFill/>
-              </a:ln>
-              <a:solidFill>
-                <a:schemeClr val="tx1"/>
-              </a:solidFill>
-              <a:effectLst/>
-              <a:latin typeface="Comic Sans MS" pitchFamily="66" charset="0"/>
-            </a:endParaRPr>
-          </a:p>
-        </p:txBody>
-      </p:sp>
-      <p:sp>
-        <p:nvSpPr>
-          <p:cNvPr id="5" name="Rectangle 4"/>
-          <p:cNvSpPr/>
-          <p:nvPr/>
-        </p:nvSpPr>
-        <p:spPr bwMode="auto">
-          <a:xfrm>
-            <a:off x="1321833" y="2224283"/>
-            <a:ext cx="2703090" cy="425132"/>
-          </a:xfrm>
-          <a:prstGeom prst="rect">
-            <a:avLst/>
-          </a:prstGeom>
-          <a:solidFill>
-            <a:schemeClr val="bg2">
-              <a:lumMod val="40000"/>
-              <a:lumOff val="60000"/>
-            </a:schemeClr>
-          </a:solidFill>
-          <a:ln w="38100" cap="flat" cmpd="sng" algn="ctr">
-            <a:solidFill>
-              <a:schemeClr val="bg2">
-                <a:lumMod val="40000"/>
-                <a:lumOff val="60000"/>
-              </a:schemeClr>
-            </a:solidFill>
-            <a:prstDash val="solid"/>
-            <a:round/>
-            <a:headEnd type="none" w="med" len="med"/>
-            <a:tailEnd type="none" w="med" len="med"/>
-          </a:ln>
-          <a:effectLst/>
-        </p:spPr>
-        <p:txBody>
-          <a:bodyPr vert="horz" wrap="square" lIns="90000" tIns="46800" rIns="90000" bIns="46800" numCol="1" rtlCol="0" anchor="ctr" anchorCtr="0" compatLnSpc="1">
-            <a:prstTxWarp prst="textNoShape">
-              <a:avLst/>
-            </a:prstTxWarp>
-            <a:spAutoFit/>
-          </a:bodyPr>
-          <a:lstStyle/>
-          <a:p>
-            <a:pPr marL="0" marR="0" indent="0" algn="ctr" defTabSz="914400" rtl="0" eaLnBrk="1" fontAlgn="base" latinLnBrk="0" hangingPunct="1">
-              <a:lnSpc>
-                <a:spcPct val="100000"/>
-              </a:lnSpc>
-              <a:spcBef>
-                <a:spcPct val="50000"/>
-              </a:spcBef>
-              <a:spcAft>
-                <a:spcPct val="0"/>
-              </a:spcAft>
-              <a:buClrTx/>
-              <a:buSzTx/>
-              <a:buFontTx/>
-              <a:buNone/>
-              <a:tabLst/>
-            </a:pPr>
-            <a:endParaRPr kumimoji="0" lang="fr-FR" sz="2400" b="0" i="0" u="none" strike="noStrike" cap="none" normalizeH="0" baseline="0" smtClean="0">
-              <a:ln>
-                <a:noFill/>
-              </a:ln>
-              <a:solidFill>
-                <a:schemeClr val="tx1"/>
-              </a:solidFill>
-              <a:effectLst/>
-              <a:latin typeface="Comic Sans MS" pitchFamily="66" charset="0"/>
-            </a:endParaRPr>
-          </a:p>
-        </p:txBody>
-      </p:sp>
-      <p:sp>
-        <p:nvSpPr>
-          <p:cNvPr id="6" name="Rectangle 5"/>
-          <p:cNvSpPr/>
-          <p:nvPr/>
-        </p:nvSpPr>
-        <p:spPr bwMode="auto">
-          <a:xfrm>
-            <a:off x="622356" y="2799521"/>
-            <a:ext cx="2777335" cy="909686"/>
-          </a:xfrm>
-          <a:prstGeom prst="rect">
-            <a:avLst/>
-          </a:prstGeom>
-          <a:solidFill>
-            <a:schemeClr val="bg2">
-              <a:lumMod val="40000"/>
-              <a:lumOff val="60000"/>
-            </a:schemeClr>
-          </a:solidFill>
-          <a:ln w="38100" cap="flat" cmpd="sng" algn="ctr">
-            <a:solidFill>
-              <a:schemeClr val="bg2">
-                <a:lumMod val="40000"/>
-                <a:lumOff val="60000"/>
-              </a:schemeClr>
-            </a:solidFill>
-            <a:prstDash val="solid"/>
-            <a:round/>
-            <a:headEnd type="none" w="med" len="med"/>
-            <a:tailEnd type="none" w="med" len="med"/>
-          </a:ln>
-          <a:effectLst/>
-        </p:spPr>
-        <p:txBody>
-          <a:bodyPr vert="horz" wrap="square" lIns="90000" tIns="46800" rIns="90000" bIns="46800" numCol="1" rtlCol="0" anchor="ctr" anchorCtr="0" compatLnSpc="1">
-            <a:prstTxWarp prst="textNoShape">
-              <a:avLst/>
-            </a:prstTxWarp>
-            <a:spAutoFit/>
-          </a:bodyPr>
-          <a:lstStyle/>
-          <a:p>
-            <a:pPr marL="0" marR="0" indent="0" algn="ctr" defTabSz="914400" rtl="0" eaLnBrk="1" fontAlgn="base" latinLnBrk="0" hangingPunct="1">
-              <a:lnSpc>
-                <a:spcPct val="100000"/>
-              </a:lnSpc>
-              <a:spcBef>
-                <a:spcPct val="50000"/>
-              </a:spcBef>
-              <a:spcAft>
-                <a:spcPct val="0"/>
-              </a:spcAft>
-              <a:buClrTx/>
-              <a:buSzTx/>
-              <a:buFontTx/>
-              <a:buNone/>
-              <a:tabLst/>
-            </a:pPr>
-            <a:endParaRPr kumimoji="0" lang="fr-FR" sz="2400" b="0" i="0" u="none" strike="noStrike" cap="none" normalizeH="0" baseline="0" smtClean="0">
-              <a:ln>
-                <a:noFill/>
-              </a:ln>
-              <a:solidFill>
-                <a:schemeClr val="tx1"/>
-              </a:solidFill>
-              <a:effectLst/>
-              <a:latin typeface="Comic Sans MS" pitchFamily="66" charset="0"/>
-            </a:endParaRPr>
-          </a:p>
-        </p:txBody>
-      </p:sp>
-      <p:sp>
-        <p:nvSpPr>
-          <p:cNvPr id="7" name="Rectangle 6"/>
-          <p:cNvSpPr/>
-          <p:nvPr/>
-        </p:nvSpPr>
-        <p:spPr bwMode="auto">
-          <a:xfrm>
-            <a:off x="1321833" y="3846783"/>
-            <a:ext cx="2789059" cy="1092542"/>
-          </a:xfrm>
-          <a:prstGeom prst="rect">
-            <a:avLst/>
-          </a:prstGeom>
-          <a:solidFill>
-            <a:schemeClr val="bg2">
-              <a:lumMod val="40000"/>
-              <a:lumOff val="60000"/>
-            </a:schemeClr>
-          </a:solidFill>
-          <a:ln w="38100" cap="flat" cmpd="sng" algn="ctr">
-            <a:solidFill>
-              <a:schemeClr val="bg2">
-                <a:lumMod val="40000"/>
-                <a:lumOff val="60000"/>
-              </a:schemeClr>
-            </a:solidFill>
-            <a:prstDash val="solid"/>
-            <a:round/>
-            <a:headEnd type="none" w="med" len="med"/>
-            <a:tailEnd type="none" w="med" len="med"/>
-          </a:ln>
-          <a:effectLst/>
-        </p:spPr>
-        <p:txBody>
-          <a:bodyPr vert="horz" wrap="square" lIns="90000" tIns="46800" rIns="90000" bIns="46800" numCol="1" rtlCol="0" anchor="ctr" anchorCtr="0" compatLnSpc="1">
-            <a:prstTxWarp prst="textNoShape">
-              <a:avLst/>
-            </a:prstTxWarp>
-            <a:spAutoFit/>
-          </a:bodyPr>
-          <a:lstStyle/>
-          <a:p>
-            <a:pPr marL="0" marR="0" indent="0" algn="ctr" defTabSz="914400" rtl="0" eaLnBrk="1" fontAlgn="base" latinLnBrk="0" hangingPunct="1">
-              <a:lnSpc>
-                <a:spcPct val="100000"/>
-              </a:lnSpc>
-              <a:spcBef>
-                <a:spcPct val="50000"/>
-              </a:spcBef>
-              <a:spcAft>
-                <a:spcPct val="0"/>
-              </a:spcAft>
-              <a:buClrTx/>
-              <a:buSzTx/>
-              <a:buFontTx/>
-              <a:buNone/>
-              <a:tabLst/>
-            </a:pPr>
-            <a:endParaRPr kumimoji="0" lang="fr-FR" sz="2400" b="0" i="0" u="none" strike="noStrike" cap="none" normalizeH="0" baseline="0" smtClean="0">
-              <a:ln>
-                <a:noFill/>
-              </a:ln>
-              <a:solidFill>
-                <a:schemeClr val="tx1"/>
-              </a:solidFill>
-              <a:effectLst/>
-              <a:latin typeface="Comic Sans MS" pitchFamily="66" charset="0"/>
-            </a:endParaRPr>
-          </a:p>
-        </p:txBody>
-      </p:sp>
-      <p:sp>
-        <p:nvSpPr>
-          <p:cNvPr id="8" name="Rectangle 7"/>
-          <p:cNvSpPr/>
-          <p:nvPr/>
-        </p:nvSpPr>
-        <p:spPr bwMode="auto">
-          <a:xfrm>
-            <a:off x="2011024" y="5076901"/>
-            <a:ext cx="2687459" cy="620518"/>
-          </a:xfrm>
-          <a:prstGeom prst="rect">
-            <a:avLst/>
-          </a:prstGeom>
-          <a:solidFill>
-            <a:schemeClr val="bg2">
-              <a:lumMod val="40000"/>
-              <a:lumOff val="60000"/>
-            </a:schemeClr>
-          </a:solidFill>
-          <a:ln w="38100" cap="flat" cmpd="sng" algn="ctr">
-            <a:solidFill>
-              <a:schemeClr val="bg2">
-                <a:lumMod val="40000"/>
-                <a:lumOff val="60000"/>
-              </a:schemeClr>
-            </a:solidFill>
-            <a:prstDash val="solid"/>
-            <a:round/>
-            <a:headEnd type="none" w="med" len="med"/>
-            <a:tailEnd type="none" w="med" len="med"/>
-          </a:ln>
-          <a:effectLst/>
-        </p:spPr>
-        <p:txBody>
-          <a:bodyPr vert="horz" wrap="square" lIns="90000" tIns="46800" rIns="90000" bIns="46800" numCol="1" rtlCol="0" anchor="ctr" anchorCtr="0" compatLnSpc="1">
-            <a:prstTxWarp prst="textNoShape">
-              <a:avLst/>
-            </a:prstTxWarp>
-            <a:spAutoFit/>
-          </a:bodyPr>
-          <a:lstStyle/>
-          <a:p>
-            <a:pPr marL="0" marR="0" indent="0" algn="ctr" defTabSz="914400" rtl="0" eaLnBrk="1" fontAlgn="base" latinLnBrk="0" hangingPunct="1">
-              <a:lnSpc>
-                <a:spcPct val="100000"/>
-              </a:lnSpc>
-              <a:spcBef>
-                <a:spcPct val="50000"/>
-              </a:spcBef>
-              <a:spcAft>
-                <a:spcPct val="0"/>
-              </a:spcAft>
-              <a:buClrTx/>
-              <a:buSzTx/>
-              <a:buFontTx/>
-              <a:buNone/>
-              <a:tabLst/>
-            </a:pPr>
-            <a:endParaRPr kumimoji="0" lang="fr-FR" sz="2400" b="0" i="0" u="none" strike="noStrike" cap="none" normalizeH="0" baseline="0" smtClean="0">
-              <a:ln>
-                <a:noFill/>
-              </a:ln>
-              <a:solidFill>
-                <a:schemeClr val="tx1"/>
-              </a:solidFill>
-              <a:effectLst/>
-              <a:latin typeface="Comic Sans MS" pitchFamily="66" charset="0"/>
-            </a:endParaRPr>
-          </a:p>
-        </p:txBody>
-      </p:sp>
-      <p:sp>
-        <p:nvSpPr>
-          <p:cNvPr id="9" name="Rectangle 8"/>
-          <p:cNvSpPr/>
-          <p:nvPr/>
-        </p:nvSpPr>
-        <p:spPr bwMode="auto">
-          <a:xfrm>
-            <a:off x="622356" y="5834995"/>
-            <a:ext cx="2777335" cy="909686"/>
-          </a:xfrm>
-          <a:prstGeom prst="rect">
-            <a:avLst/>
-          </a:prstGeom>
-          <a:solidFill>
-            <a:schemeClr val="bg2">
-              <a:lumMod val="40000"/>
-              <a:lumOff val="60000"/>
-            </a:schemeClr>
-          </a:solidFill>
-          <a:ln w="38100" cap="flat" cmpd="sng" algn="ctr">
-            <a:solidFill>
-              <a:schemeClr val="bg2">
-                <a:lumMod val="40000"/>
-                <a:lumOff val="60000"/>
-              </a:schemeClr>
-            </a:solidFill>
-            <a:prstDash val="solid"/>
-            <a:round/>
-            <a:headEnd type="none" w="med" len="med"/>
-            <a:tailEnd type="none" w="med" len="med"/>
-          </a:ln>
-          <a:effectLst/>
-        </p:spPr>
-        <p:txBody>
-          <a:bodyPr vert="horz" wrap="square" lIns="90000" tIns="46800" rIns="90000" bIns="46800" numCol="1" rtlCol="0" anchor="ctr" anchorCtr="0" compatLnSpc="1">
-            <a:prstTxWarp prst="textNoShape">
-              <a:avLst/>
-            </a:prstTxWarp>
-            <a:spAutoFit/>
-          </a:bodyPr>
-          <a:lstStyle/>
-          <a:p>
-            <a:pPr marL="0" marR="0" indent="0" algn="ctr" defTabSz="914400" rtl="0" eaLnBrk="1" fontAlgn="base" latinLnBrk="0" hangingPunct="1">
-              <a:lnSpc>
-                <a:spcPct val="100000"/>
-              </a:lnSpc>
-              <a:spcBef>
-                <a:spcPct val="50000"/>
-              </a:spcBef>
-              <a:spcAft>
-                <a:spcPct val="0"/>
-              </a:spcAft>
-              <a:buClrTx/>
-              <a:buSzTx/>
-              <a:buFontTx/>
-              <a:buNone/>
-              <a:tabLst/>
-            </a:pPr>
-            <a:endParaRPr kumimoji="0" lang="fr-FR" sz="2400" b="0" i="0" u="none" strike="noStrike" cap="none" normalizeH="0" baseline="0" smtClean="0">
-              <a:ln>
-                <a:noFill/>
-              </a:ln>
-              <a:solidFill>
-                <a:schemeClr val="tx1"/>
-              </a:solidFill>
-              <a:effectLst/>
-              <a:latin typeface="Comic Sans MS" pitchFamily="66" charset="0"/>
-            </a:endParaRPr>
-          </a:p>
-        </p:txBody>
-      </p:sp>
-      <p:sp>
-        <p:nvSpPr>
-          <p:cNvPr id="15" name="ZoneTexte 14"/>
-          <p:cNvSpPr txBox="1"/>
-          <p:nvPr/>
-        </p:nvSpPr>
-        <p:spPr>
-          <a:xfrm>
-            <a:off x="1375506" y="3757709"/>
-            <a:ext cx="4048370" cy="1200329"/>
-          </a:xfrm>
-          <a:prstGeom prst="rect">
-            <a:avLst/>
-          </a:prstGeom>
-          <a:noFill/>
-        </p:spPr>
-        <p:txBody>
-          <a:bodyPr wrap="square" rtlCol="0">
-            <a:spAutoFit/>
-          </a:bodyPr>
-          <a:lstStyle/>
-          <a:p>
-            <a:r>
-              <a:rPr lang="fr-FR" sz="3600" dirty="0" smtClean="0">
-                <a:latin typeface="Calibri" panose="020F0502020204030204" pitchFamily="34" charset="0"/>
-                <a:cs typeface="Calibri" panose="020F0502020204030204" pitchFamily="34" charset="0"/>
-              </a:rPr>
-              <a:t>x = 1</a:t>
-            </a:r>
-          </a:p>
-          <a:p>
-            <a:r>
-              <a:rPr lang="fr-FR" sz="3600" dirty="0" err="1" smtClean="0">
-                <a:latin typeface="Calibri" panose="020F0502020204030204" pitchFamily="34" charset="0"/>
-                <a:cs typeface="Calibri" panose="020F0502020204030204" pitchFamily="34" charset="0"/>
-              </a:rPr>
-              <a:t>print</a:t>
-            </a:r>
-            <a:r>
-              <a:rPr lang="fr-FR" sz="3600" dirty="0" smtClean="0">
-                <a:latin typeface="Calibri" panose="020F0502020204030204" pitchFamily="34" charset="0"/>
-                <a:cs typeface="Calibri" panose="020F0502020204030204" pitchFamily="34" charset="0"/>
-              </a:rPr>
-              <a:t>(x)</a:t>
-            </a:r>
-            <a:endParaRPr lang="fr-FR" sz="3600" dirty="0">
-              <a:latin typeface="Calibri" panose="020F0502020204030204" pitchFamily="34" charset="0"/>
-              <a:cs typeface="Calibri" panose="020F0502020204030204" pitchFamily="34" charset="0"/>
-            </a:endParaRPr>
-          </a:p>
-        </p:txBody>
-      </p:sp>
-      <p:sp>
-        <p:nvSpPr>
-          <p:cNvPr id="16" name="Rectangle 15"/>
-          <p:cNvSpPr/>
-          <p:nvPr/>
-        </p:nvSpPr>
-        <p:spPr bwMode="auto">
-          <a:xfrm>
-            <a:off x="622356" y="2796407"/>
-            <a:ext cx="2777335" cy="909686"/>
-          </a:xfrm>
-          <a:prstGeom prst="rect">
-            <a:avLst/>
-          </a:prstGeom>
-          <a:solidFill>
-            <a:srgbClr val="FF0000"/>
-          </a:solidFill>
-          <a:ln w="38100" cap="flat" cmpd="sng" algn="ctr">
-            <a:solidFill>
-              <a:srgbClr val="FF0000"/>
-            </a:solidFill>
-            <a:prstDash val="solid"/>
-            <a:round/>
-            <a:headEnd type="none" w="med" len="med"/>
-            <a:tailEnd type="none" w="med" len="med"/>
-          </a:ln>
-          <a:effectLst/>
-        </p:spPr>
-        <p:txBody>
-          <a:bodyPr vert="horz" wrap="square" lIns="90000" tIns="46800" rIns="90000" bIns="46800" numCol="1" rtlCol="0" anchor="ctr" anchorCtr="0" compatLnSpc="1">
-            <a:prstTxWarp prst="textNoShape">
-              <a:avLst/>
-            </a:prstTxWarp>
-            <a:spAutoFit/>
-          </a:bodyPr>
-          <a:lstStyle/>
-          <a:p>
-            <a:pPr marL="0" marR="0" indent="0" algn="ctr" defTabSz="914400" rtl="0" eaLnBrk="1" fontAlgn="base" latinLnBrk="0" hangingPunct="1">
-              <a:lnSpc>
-                <a:spcPct val="100000"/>
-              </a:lnSpc>
-              <a:spcBef>
-                <a:spcPct val="50000"/>
-              </a:spcBef>
-              <a:spcAft>
-                <a:spcPct val="0"/>
-              </a:spcAft>
-              <a:buClrTx/>
-              <a:buSzTx/>
-              <a:buFontTx/>
-              <a:buNone/>
-              <a:tabLst/>
-            </a:pPr>
-            <a:endParaRPr kumimoji="0" lang="fr-FR" sz="2400" b="0" i="0" u="none" strike="noStrike" cap="none" normalizeH="0" baseline="0" smtClean="0">
-              <a:ln>
-                <a:noFill/>
-              </a:ln>
-              <a:solidFill>
-                <a:schemeClr val="tx1"/>
-              </a:solidFill>
-              <a:effectLst/>
-              <a:latin typeface="Comic Sans MS" pitchFamily="66" charset="0"/>
-            </a:endParaRPr>
-          </a:p>
-        </p:txBody>
-      </p:sp>
-      <p:sp>
-        <p:nvSpPr>
-          <p:cNvPr id="17" name="Rectangle 16"/>
-          <p:cNvSpPr/>
-          <p:nvPr/>
-        </p:nvSpPr>
-        <p:spPr bwMode="auto">
-          <a:xfrm>
-            <a:off x="2011024" y="5086257"/>
-            <a:ext cx="2687459" cy="620518"/>
-          </a:xfrm>
-          <a:prstGeom prst="rect">
-            <a:avLst/>
-          </a:prstGeom>
-          <a:solidFill>
-            <a:srgbClr val="FF0000"/>
-          </a:solidFill>
-          <a:ln w="38100" cap="flat" cmpd="sng" algn="ctr">
-            <a:solidFill>
-              <a:srgbClr val="FF0000"/>
-            </a:solidFill>
-            <a:prstDash val="solid"/>
-            <a:round/>
-            <a:headEnd type="none" w="med" len="med"/>
-            <a:tailEnd type="none" w="med" len="med"/>
-          </a:ln>
-          <a:effectLst/>
-        </p:spPr>
-        <p:txBody>
-          <a:bodyPr vert="horz" wrap="square" lIns="90000" tIns="46800" rIns="90000" bIns="46800" numCol="1" rtlCol="0" anchor="ctr" anchorCtr="0" compatLnSpc="1">
-            <a:prstTxWarp prst="textNoShape">
-              <a:avLst/>
-            </a:prstTxWarp>
-            <a:spAutoFit/>
-          </a:bodyPr>
-          <a:lstStyle/>
-          <a:p>
-            <a:pPr marL="0" marR="0" indent="0" algn="ctr" defTabSz="914400" rtl="0" eaLnBrk="1" fontAlgn="base" latinLnBrk="0" hangingPunct="1">
-              <a:lnSpc>
-                <a:spcPct val="100000"/>
-              </a:lnSpc>
-              <a:spcBef>
-                <a:spcPct val="50000"/>
-              </a:spcBef>
-              <a:spcAft>
-                <a:spcPct val="0"/>
-              </a:spcAft>
-              <a:buClrTx/>
-              <a:buSzTx/>
-              <a:buFontTx/>
-              <a:buNone/>
-              <a:tabLst/>
-            </a:pPr>
-            <a:endParaRPr kumimoji="0" lang="fr-FR" sz="2400" b="0" i="0" u="none" strike="noStrike" cap="none" normalizeH="0" baseline="0" smtClean="0">
-              <a:ln>
-                <a:noFill/>
-              </a:ln>
-              <a:solidFill>
-                <a:schemeClr val="tx1"/>
-              </a:solidFill>
-              <a:effectLst/>
-              <a:latin typeface="Comic Sans MS" pitchFamily="66" charset="0"/>
-            </a:endParaRPr>
-          </a:p>
-        </p:txBody>
-      </p:sp>
-      <p:sp>
-        <p:nvSpPr>
-          <p:cNvPr id="18" name="Rectangle 17"/>
-          <p:cNvSpPr/>
-          <p:nvPr/>
-        </p:nvSpPr>
-        <p:spPr bwMode="auto">
-          <a:xfrm>
-            <a:off x="622356" y="698935"/>
-            <a:ext cx="2714811" cy="1382519"/>
-          </a:xfrm>
-          <a:prstGeom prst="rect">
-            <a:avLst/>
-          </a:prstGeom>
-          <a:solidFill>
-            <a:srgbClr val="FF0000"/>
-          </a:solidFill>
-          <a:ln w="38100" cap="flat" cmpd="sng" algn="ctr">
-            <a:solidFill>
-              <a:srgbClr val="FF0000"/>
-            </a:solidFill>
-            <a:prstDash val="solid"/>
-            <a:round/>
-            <a:headEnd type="none" w="med" len="med"/>
-            <a:tailEnd type="none" w="med" len="med"/>
-          </a:ln>
-          <a:effectLst/>
-        </p:spPr>
-        <p:txBody>
-          <a:bodyPr vert="horz" wrap="square" lIns="90000" tIns="46800" rIns="90000" bIns="46800" numCol="1" rtlCol="0" anchor="ctr" anchorCtr="0" compatLnSpc="1">
-            <a:prstTxWarp prst="textNoShape">
-              <a:avLst/>
-            </a:prstTxWarp>
-            <a:spAutoFit/>
-          </a:bodyPr>
-          <a:lstStyle/>
-          <a:p>
-            <a:pPr marL="0" marR="0" indent="0" algn="ctr" defTabSz="914400" rtl="0" eaLnBrk="1" fontAlgn="base" latinLnBrk="0" hangingPunct="1">
-              <a:lnSpc>
-                <a:spcPct val="100000"/>
-              </a:lnSpc>
-              <a:spcBef>
-                <a:spcPct val="50000"/>
-              </a:spcBef>
-              <a:spcAft>
-                <a:spcPct val="0"/>
-              </a:spcAft>
-              <a:buClrTx/>
-              <a:buSzTx/>
-              <a:buFontTx/>
-              <a:buNone/>
-              <a:tabLst/>
-            </a:pPr>
-            <a:endParaRPr kumimoji="0" lang="fr-FR" sz="2400" b="0" i="0" u="none" strike="noStrike" cap="none" normalizeH="0" baseline="0" smtClean="0">
-              <a:ln>
-                <a:noFill/>
-              </a:ln>
-              <a:solidFill>
-                <a:schemeClr val="tx1"/>
-              </a:solidFill>
-              <a:effectLst/>
-              <a:latin typeface="Comic Sans MS" pitchFamily="66" charset="0"/>
-            </a:endParaRPr>
-          </a:p>
-        </p:txBody>
-      </p:sp>
-    </p:spTree>
-    <p:extLst>
-      <p:ext uri="{BB962C8B-B14F-4D97-AF65-F5344CB8AC3E}">
-        <p14:creationId xmlns:p14="http://schemas.microsoft.com/office/powerpoint/2010/main" val="927033508"/>
-      </p:ext>
-    </p:extLst>
-  </p:cSld>
-  <p:clrMapOvr>
-    <a:masterClrMapping/>
-  </p:clrMapOvr>
-  <p:timing>
-    <p:tnLst>
-      <p:par>
-        <p:cTn id="1" dur="indefinite" restart="never" nodeType="tmRoot">
-          <p:childTnLst>
-            <p:seq concurrent="1" nextAc="seek">
-              <p:cTn id="2" dur="indefinite" nodeType="mainSeq">
-                <p:childTnLst>
-                  <p:par>
-                    <p:cTn id="3" fill="hold">
-                      <p:stCondLst>
-                        <p:cond delay="indefinite"/>
-                      </p:stCondLst>
-                      <p:childTnLst>
-                        <p:par>
-                          <p:cTn id="4" fill="hold">
-                            <p:stCondLst>
-                              <p:cond delay="0"/>
-                            </p:stCondLst>
-                            <p:childTnLst>
-                              <p:par>
-                                <p:cTn id="5" presetID="10" presetClass="entr" presetSubtype="0" fill="hold" grpId="0" nodeType="clickEffect">
-                                  <p:stCondLst>
-                                    <p:cond delay="0"/>
-                                  </p:stCondLst>
-                                  <p:childTnLst>
-                                    <p:set>
-                                      <p:cBhvr>
-                                        <p:cTn id="6" dur="1" fill="hold">
-                                          <p:stCondLst>
-                                            <p:cond delay="0"/>
-                                          </p:stCondLst>
-                                        </p:cTn>
-                                        <p:tgtEl>
-                                          <p:spTgt spid="16"/>
-                                        </p:tgtEl>
-                                        <p:attrNameLst>
-                                          <p:attrName>style.visibility</p:attrName>
-                                        </p:attrNameLst>
-                                      </p:cBhvr>
-                                      <p:to>
-                                        <p:strVal val="visible"/>
-                                      </p:to>
-                                    </p:set>
-                                    <p:animEffect transition="in" filter="fade">
-                                      <p:cBhvr>
-                                        <p:cTn id="7" dur="500"/>
-                                        <p:tgtEl>
-                                          <p:spTgt spid="16"/>
-                                        </p:tgtEl>
-                                      </p:cBhvr>
-                                    </p:animEffect>
-                                  </p:childTnLst>
-                                </p:cTn>
-                              </p:par>
-                            </p:childTnLst>
-                          </p:cTn>
-                        </p:par>
-                        <p:par>
-                          <p:cTn id="8" fill="hold">
-                            <p:stCondLst>
-                              <p:cond delay="500"/>
-                            </p:stCondLst>
-                            <p:childTnLst>
-                              <p:par>
-                                <p:cTn id="9" presetID="1" presetClass="exit" presetSubtype="0" fill="hold" grpId="1" nodeType="afterEffect">
-                                  <p:stCondLst>
-                                    <p:cond delay="1000"/>
-                                  </p:stCondLst>
-                                  <p:childTnLst>
-                                    <p:set>
-                                      <p:cBhvr>
-                                        <p:cTn id="10" dur="1" fill="hold">
-                                          <p:stCondLst>
-                                            <p:cond delay="0"/>
-                                          </p:stCondLst>
-                                        </p:cTn>
-                                        <p:tgtEl>
-                                          <p:spTgt spid="16"/>
-                                        </p:tgtEl>
-                                        <p:attrNameLst>
-                                          <p:attrName>style.visibility</p:attrName>
-                                        </p:attrNameLst>
-                                      </p:cBhvr>
-                                      <p:to>
-                                        <p:strVal val="hidden"/>
-                                      </p:to>
-                                    </p:set>
-                                  </p:childTnLst>
-                                </p:cTn>
-                              </p:par>
-                            </p:childTnLst>
-                          </p:cTn>
-                        </p:par>
-                        <p:par>
-                          <p:cTn id="11" fill="hold">
-                            <p:stCondLst>
-                              <p:cond delay="1500"/>
-                            </p:stCondLst>
-                            <p:childTnLst>
-                              <p:par>
-                                <p:cTn id="12" presetID="10" presetClass="entr" presetSubtype="0" fill="hold" grpId="0" nodeType="afterEffect">
-                                  <p:stCondLst>
-                                    <p:cond delay="1000"/>
-                                  </p:stCondLst>
-                                  <p:childTnLst>
-                                    <p:set>
-                                      <p:cBhvr>
-                                        <p:cTn id="13" dur="1" fill="hold">
-                                          <p:stCondLst>
-                                            <p:cond delay="0"/>
-                                          </p:stCondLst>
-                                        </p:cTn>
-                                        <p:tgtEl>
-                                          <p:spTgt spid="17"/>
-                                        </p:tgtEl>
-                                        <p:attrNameLst>
-                                          <p:attrName>style.visibility</p:attrName>
-                                        </p:attrNameLst>
-                                      </p:cBhvr>
-                                      <p:to>
-                                        <p:strVal val="visible"/>
-                                      </p:to>
-                                    </p:set>
-                                    <p:animEffect transition="in" filter="fade">
-                                      <p:cBhvr>
-                                        <p:cTn id="14" dur="500"/>
-                                        <p:tgtEl>
-                                          <p:spTgt spid="17"/>
-                                        </p:tgtEl>
-                                      </p:cBhvr>
-                                    </p:animEffect>
-                                  </p:childTnLst>
-                                </p:cTn>
-                              </p:par>
-                            </p:childTnLst>
-                          </p:cTn>
-                        </p:par>
-                        <p:par>
-                          <p:cTn id="15" fill="hold">
-                            <p:stCondLst>
-                              <p:cond delay="3000"/>
-                            </p:stCondLst>
-                            <p:childTnLst>
-                              <p:par>
-                                <p:cTn id="16" presetID="1" presetClass="exit" presetSubtype="0" fill="hold" grpId="1" nodeType="afterEffect">
-                                  <p:stCondLst>
-                                    <p:cond delay="1000"/>
-                                  </p:stCondLst>
-                                  <p:childTnLst>
-                                    <p:set>
-                                      <p:cBhvr>
-                                        <p:cTn id="17" dur="1" fill="hold">
-                                          <p:stCondLst>
-                                            <p:cond delay="0"/>
-                                          </p:stCondLst>
-                                        </p:cTn>
-                                        <p:tgtEl>
-                                          <p:spTgt spid="17"/>
-                                        </p:tgtEl>
-                                        <p:attrNameLst>
-                                          <p:attrName>style.visibility</p:attrName>
-                                        </p:attrNameLst>
-                                      </p:cBhvr>
-                                      <p:to>
-                                        <p:strVal val="hidden"/>
-                                      </p:to>
-                                    </p:set>
-                                  </p:childTnLst>
-                                </p:cTn>
-                              </p:par>
-                            </p:childTnLst>
-                          </p:cTn>
-                        </p:par>
-                        <p:par>
-                          <p:cTn id="18" fill="hold">
-                            <p:stCondLst>
-                              <p:cond delay="4000"/>
-                            </p:stCondLst>
-                            <p:childTnLst>
-                              <p:par>
-                                <p:cTn id="19" presetID="10" presetClass="entr" presetSubtype="0" fill="hold" grpId="0" nodeType="afterEffect">
-                                  <p:stCondLst>
-                                    <p:cond delay="1000"/>
-                                  </p:stCondLst>
-                                  <p:childTnLst>
-                                    <p:set>
-                                      <p:cBhvr>
-                                        <p:cTn id="20" dur="1" fill="hold">
-                                          <p:stCondLst>
-                                            <p:cond delay="0"/>
-                                          </p:stCondLst>
-                                        </p:cTn>
-                                        <p:tgtEl>
-                                          <p:spTgt spid="18"/>
-                                        </p:tgtEl>
-                                        <p:attrNameLst>
-                                          <p:attrName>style.visibility</p:attrName>
-                                        </p:attrNameLst>
-                                      </p:cBhvr>
-                                      <p:to>
-                                        <p:strVal val="visible"/>
-                                      </p:to>
-                                    </p:set>
-                                    <p:animEffect transition="in" filter="fade">
-                                      <p:cBhvr>
-                                        <p:cTn id="21" dur="500"/>
-                                        <p:tgtEl>
-                                          <p:spTgt spid="18"/>
-                                        </p:tgtEl>
-                                      </p:cBhvr>
-                                    </p:animEffect>
-                                  </p:childTnLst>
-                                </p:cTn>
-                              </p:par>
-                            </p:childTnLst>
-                          </p:cTn>
-                        </p:par>
-                        <p:par>
-                          <p:cTn id="22" fill="hold">
-                            <p:stCondLst>
-                              <p:cond delay="5500"/>
-                            </p:stCondLst>
-                            <p:childTnLst>
-                              <p:par>
-                                <p:cTn id="23" presetID="1" presetClass="exit" presetSubtype="0" fill="hold" grpId="1" nodeType="afterEffect">
-                                  <p:stCondLst>
-                                    <p:cond delay="1000"/>
-                                  </p:stCondLst>
-                                  <p:childTnLst>
-                                    <p:set>
-                                      <p:cBhvr>
-                                        <p:cTn id="24" dur="1" fill="hold">
-                                          <p:stCondLst>
-                                            <p:cond delay="0"/>
-                                          </p:stCondLst>
-                                        </p:cTn>
-                                        <p:tgtEl>
-                                          <p:spTgt spid="18"/>
-                                        </p:tgtEl>
-                                        <p:attrNameLst>
-                                          <p:attrName>style.visibility</p:attrName>
-                                        </p:attrNameLst>
-                                      </p:cBhvr>
-                                      <p:to>
-                                        <p:strVal val="hidden"/>
-                                      </p:to>
-                                    </p:set>
-                                  </p:childTnLst>
-                                </p:cTn>
-                              </p:par>
-                            </p:childTnLst>
-                          </p:cTn>
-                        </p:par>
-                      </p:childTnLst>
-                    </p:cTn>
-                  </p:par>
-                </p:childTnLst>
-              </p:cTn>
-              <p:prevCondLst>
-                <p:cond evt="onPrev" delay="0">
-                  <p:tgtEl>
-                    <p:sldTgt/>
-                  </p:tgtEl>
-                </p:cond>
-              </p:prevCondLst>
-              <p:nextCondLst>
-                <p:cond evt="onNext" delay="0">
-                  <p:tgtEl>
-                    <p:sldTgt/>
-                  </p:tgtEl>
-                </p:cond>
-              </p:nextCondLst>
-            </p:seq>
-          </p:childTnLst>
-        </p:cTn>
-      </p:par>
-    </p:tnLst>
-    <p:bldLst>
-      <p:bldP spid="16" grpId="0" animBg="1"/>
-      <p:bldP spid="16" grpId="1" animBg="1"/>
-      <p:bldP spid="17" grpId="0" animBg="1"/>
-      <p:bldP spid="17" grpId="1" animBg="1"/>
-      <p:bldP spid="18" grpId="0" animBg="1"/>
-      <p:bldP spid="18" grpId="1" animBg="1"/>
-    </p:bldLst>
-  </p:timing>
-</p:sld>
-</file>
-
-<file path=ppt/slides/slide3.xml><?xml version="1.0" encoding="utf-8"?>
-<p:sld xmlns:a="http://schemas.openxmlformats.org/drawingml/2006/main" xmlns:r="http://schemas.openxmlformats.org/officeDocument/2006/relationships" xmlns:p="http://schemas.openxmlformats.org/presentationml/2006/main">
-  <p:cSld>
-    <p:spTree>
-      <p:nvGrpSpPr>
-        <p:cNvPr id="1" name=""/>
-        <p:cNvGrpSpPr/>
-        <p:nvPr/>
-      </p:nvGrpSpPr>
-      <p:grpSpPr>
-        <a:xfrm>
-          <a:off x="0" y="0"/>
-          <a:ext cx="0" cy="0"/>
-          <a:chOff x="0" y="0"/>
-          <a:chExt cx="0" cy="0"/>
-        </a:xfrm>
-      </p:grpSpPr>
-      <p:sp>
-        <p:nvSpPr>
           <p:cNvPr id="4" name="ZoneTexte 3"/>
           <p:cNvSpPr txBox="1"/>
           <p:nvPr/>
@@ -6280,7 +5279,7 @@
 </p:sld>
 </file>
 
-<file path=ppt/slides/slide4.xml><?xml version="1.0" encoding="utf-8"?>
+<file path=ppt/slides/slide3.xml><?xml version="1.0" encoding="utf-8"?>
 <p:sld xmlns:a="http://schemas.openxmlformats.org/drawingml/2006/main" xmlns:r="http://schemas.openxmlformats.org/officeDocument/2006/relationships" xmlns:p="http://schemas.openxmlformats.org/presentationml/2006/main">
   <p:cSld>
     <p:spTree>

</xml_diff>